<commit_message>
Update Breast Cancer Prediction (BCP) Project.pptx
</commit_message>
<xml_diff>
--- a/Breast Cancer Prediction (BCP) Project.pptx
+++ b/Breast Cancer Prediction (BCP) Project.pptx
@@ -5326,8 +5326,8 @@
         </p:nvSpPr>
         <p:spPr>
           <a:xfrm>
-            <a:off x="1097280" y="1039091"/>
-            <a:ext cx="10058400" cy="698269"/>
+            <a:off x="1066800" y="954870"/>
+            <a:ext cx="10058400" cy="713510"/>
           </a:xfrm>
         </p:spPr>
         <p:txBody>
@@ -5353,12 +5353,44 @@
             <p:ph idx="1"/>
           </p:nvPr>
         </p:nvSpPr>
-        <p:spPr/>
+        <p:spPr>
+          <a:xfrm>
+            <a:off x="1097280" y="1845734"/>
+            <a:ext cx="10058400" cy="4278340"/>
+          </a:xfrm>
+        </p:spPr>
         <p:txBody>
           <a:bodyPr>
             <a:normAutofit/>
           </a:bodyPr>
           <a:lstStyle/>
+          <a:p>
+            <a:r>
+              <a:rPr lang="en-US" dirty="0"/>
+              <a:t>Breast Cancer (BC) – is a type of cancer that starts in the breast. And this type of cancer starts when cells begin to grow out of control – which usually forms a tumor that can often be seen on an x-ray or felt as a lump and most of these lumps are benign and/or not cancer (malignant) </a:t>
+            </a:r>
+            <a:r>
+              <a:rPr lang="en-US" b="1" dirty="0"/>
+              <a:t>[1].</a:t>
+            </a:r>
+            <a:r>
+              <a:rPr lang="en-US" dirty="0"/>
+              <a:t> All over the world, BC has been identified as one of the most widespread cancers amongst women and the major cause of female cancer death. Doctors and researchers alike have been focused on the timely detection of cancer as it spreads in surrounding tissues in the body (Siegel, Miller, &amp; Jemal, 2015) </a:t>
+            </a:r>
+            <a:r>
+              <a:rPr lang="en-US" b="1" dirty="0"/>
+              <a:t>[3]</a:t>
+            </a:r>
+            <a:r>
+              <a:rPr lang="en-US" dirty="0"/>
+              <a:t>. Hence, the timely detection of cancer is important for the survival rate after undergoing cancer treatment </a:t>
+            </a:r>
+            <a:r>
+              <a:rPr lang="en-US" b="1" dirty="0"/>
+              <a:t>[1].</a:t>
+            </a:r>
+            <a:endParaRPr lang="en-US" dirty="0"/>
+          </a:p>
           <a:p>
             <a:pPr>
               <a:lnSpc>
@@ -5366,8 +5398,8 @@
               </a:lnSpc>
             </a:pPr>
             <a:r>
-              <a:rPr lang="en-US" sz="2200" dirty="0"/>
-              <a:t>The Breast Cancer Dataset is a dataset of features computed from breast mass of different patients across the country. Each instance of features corresponds to a malignant or benign tumor. </a:t>
+              <a:rPr lang="en-US" dirty="0"/>
+              <a:t>In this project, I will be using the dataset from UCI Irvine Machine Learning Repository (UCI) to see how well we can accurately detect and/or classify if a tumor is malignant or benign</a:t>
             </a:r>
           </a:p>
           <a:p>
@@ -5378,18 +5410,7 @@
             </a:pPr>
             <a:r>
               <a:rPr lang="en-US" sz="2200" dirty="0"/>
-              <a:t>And, the motivation behind this project is to develop an algorithm, which would be used in predicting whether a patient has malignant or benign tumors, based on the features computed from that patient breast mass. </a:t>
-            </a:r>
-          </a:p>
-          <a:p>
-            <a:pPr>
-              <a:lnSpc>
-                <a:spcPct val="100000"/>
-              </a:lnSpc>
-            </a:pPr>
-            <a:r>
-              <a:rPr lang="en-US" sz="2200" dirty="0"/>
-              <a:t>I decided to use this dataset for my first project on machine learning, since it’s a very straightforward dataset with no missing values and all variables being real-valued (no categorical variables).Number of attributes for each patient: 31</a:t>
+              <a:t>I decided to use this dataset for my first project on machine learning, since it’s a very straightforward dataset with no missing values and all variables being real-valued (no categorical variables). Number of attributes for each patient: 31</a:t>
             </a:r>
           </a:p>
         </p:txBody>

</xml_diff>